<commit_message>
Fix mistake in presentation
</commit_message>
<xml_diff>
--- a/Dlouhodobá maturitní práce.pptx
+++ b/Dlouhodobá maturitní práce.pptx
@@ -3427,10 +3427,6 @@
               <a:rPr lang="cs-CZ" sz="2100" dirty="0"/>
               <a:t>Střední průmyslová škola a Vyšší odborná škola Brno, Sokolská,</a:t>
             </a:r>
-            <a:r>
-              <a:rPr lang="cs-CZ" sz="2100" dirty="0"/>
-              <a:t/>
-            </a:r>
             <a:br>
               <a:rPr lang="cs-CZ" sz="2100" dirty="0"/>
             </a:br>
@@ -3438,7 +3434,6 @@
               <a:rPr lang="cs-CZ" sz="2100" dirty="0"/>
               <a:t>příspěvková organizace</a:t>
             </a:r>
-            <a:endParaRPr lang="cs-CZ" sz="2100" dirty="0"/>
           </a:p>
         </p:txBody>
       </p:sp>
@@ -4574,8 +4569,11 @@
           <a:bodyPr/>
           <a:lstStyle/>
           <a:p>
-            <a:r>
-              <a:rPr lang="cs-CZ" dirty="0" smtClean="0"/>
+            <a:pPr marL="0" indent="0">
+              <a:buNone/>
+            </a:pPr>
+            <a:r>
+              <a:rPr lang="cs-CZ" b="1" dirty="0" smtClean="0"/>
               <a:t>Hlavní výhody:</a:t>
             </a:r>
           </a:p>

</xml_diff>